<commit_message>
Added PPT, Report and Published Paper in DOCUMENTS foler
</commit_message>
<xml_diff>
--- a/DOCUMENTS/Final review ppt.pptx
+++ b/DOCUMENTS/Final review ppt.pptx
@@ -152,7 +152,7 @@
   </p:defaultTextStyle>
   <p:extLst>
     <p:ext uri="{EFAFB233-063F-42B5-8137-9DF3F51BA10A}">
-      <p15:sldGuideLst xmlns:p15="http://schemas.microsoft.com/office/powerpoint/2012/main" xmlns="">
+      <p15:sldGuideLst xmlns="" xmlns:p15="http://schemas.microsoft.com/office/powerpoint/2012/main">
         <p15:guide id="1" orient="horz" pos="2160">
           <p15:clr>
             <a:srgbClr val="A4A3A4"/>
@@ -747,7 +747,7 @@
           <p:cNvPr id="4" name="Date Placeholder 3">
             <a:extLst>
               <a:ext uri="{FF2B5EF4-FFF2-40B4-BE49-F238E27FC236}">
-                <a16:creationId xmlns:a16="http://schemas.microsoft.com/office/drawing/2014/main" xmlns="" id="{0FB56918-D4B3-422F-BFF9-D10393CB1268}"/>
+                <a16:creationId xmlns="" xmlns:a16="http://schemas.microsoft.com/office/drawing/2014/main" id="{0FB56918-D4B3-422F-BFF9-D10393CB1268}"/>
               </a:ext>
             </a:extLst>
           </p:cNvPr>
@@ -780,7 +780,7 @@
           <p:cNvPr id="5" name="Footer Placeholder 4">
             <a:extLst>
               <a:ext uri="{FF2B5EF4-FFF2-40B4-BE49-F238E27FC236}">
-                <a16:creationId xmlns:a16="http://schemas.microsoft.com/office/drawing/2014/main" xmlns="" id="{A082B6A4-3E11-4AFE-97A2-755EDA1DD9B7}"/>
+                <a16:creationId xmlns="" xmlns:a16="http://schemas.microsoft.com/office/drawing/2014/main" id="{A082B6A4-3E11-4AFE-97A2-755EDA1DD9B7}"/>
               </a:ext>
             </a:extLst>
           </p:cNvPr>
@@ -809,7 +809,7 @@
           <p:cNvPr id="6" name="Slide Number Placeholder 5">
             <a:extLst>
               <a:ext uri="{FF2B5EF4-FFF2-40B4-BE49-F238E27FC236}">
-                <a16:creationId xmlns:a16="http://schemas.microsoft.com/office/drawing/2014/main" xmlns="" id="{9A2D3FD1-471F-422B-AFB8-CC8FCE5DCE6C}"/>
+                <a16:creationId xmlns="" xmlns:a16="http://schemas.microsoft.com/office/drawing/2014/main" id="{9A2D3FD1-471F-422B-AFB8-CC8FCE5DCE6C}"/>
               </a:ext>
             </a:extLst>
           </p:cNvPr>
@@ -950,7 +950,7 @@
           <p:cNvPr id="4" name="Date Placeholder 3">
             <a:extLst>
               <a:ext uri="{FF2B5EF4-FFF2-40B4-BE49-F238E27FC236}">
-                <a16:creationId xmlns:a16="http://schemas.microsoft.com/office/drawing/2014/main" xmlns="" id="{0A0AAE25-87DE-4998-B6CE-F47978987C8B}"/>
+                <a16:creationId xmlns="" xmlns:a16="http://schemas.microsoft.com/office/drawing/2014/main" id="{0A0AAE25-87DE-4998-B6CE-F47978987C8B}"/>
               </a:ext>
             </a:extLst>
           </p:cNvPr>
@@ -983,7 +983,7 @@
           <p:cNvPr id="5" name="Footer Placeholder 4">
             <a:extLst>
               <a:ext uri="{FF2B5EF4-FFF2-40B4-BE49-F238E27FC236}">
-                <a16:creationId xmlns:a16="http://schemas.microsoft.com/office/drawing/2014/main" xmlns="" id="{B0A9861B-6D3E-4215-A3D0-377EC12DA54B}"/>
+                <a16:creationId xmlns="" xmlns:a16="http://schemas.microsoft.com/office/drawing/2014/main" id="{B0A9861B-6D3E-4215-A3D0-377EC12DA54B}"/>
               </a:ext>
             </a:extLst>
           </p:cNvPr>
@@ -1012,7 +1012,7 @@
           <p:cNvPr id="6" name="Slide Number Placeholder 5">
             <a:extLst>
               <a:ext uri="{FF2B5EF4-FFF2-40B4-BE49-F238E27FC236}">
-                <a16:creationId xmlns:a16="http://schemas.microsoft.com/office/drawing/2014/main" xmlns="" id="{DEC5A02C-FFC9-401E-8BCD-D06F65B1664C}"/>
+                <a16:creationId xmlns="" xmlns:a16="http://schemas.microsoft.com/office/drawing/2014/main" id="{DEC5A02C-FFC9-401E-8BCD-D06F65B1664C}"/>
               </a:ext>
             </a:extLst>
           </p:cNvPr>
@@ -1163,7 +1163,7 @@
           <p:cNvPr id="4" name="Date Placeholder 3">
             <a:extLst>
               <a:ext uri="{FF2B5EF4-FFF2-40B4-BE49-F238E27FC236}">
-                <a16:creationId xmlns:a16="http://schemas.microsoft.com/office/drawing/2014/main" xmlns="" id="{164B4638-3310-4031-B55D-BE295B1A7BDC}"/>
+                <a16:creationId xmlns="" xmlns:a16="http://schemas.microsoft.com/office/drawing/2014/main" id="{164B4638-3310-4031-B55D-BE295B1A7BDC}"/>
               </a:ext>
             </a:extLst>
           </p:cNvPr>
@@ -1196,7 +1196,7 @@
           <p:cNvPr id="5" name="Footer Placeholder 4">
             <a:extLst>
               <a:ext uri="{FF2B5EF4-FFF2-40B4-BE49-F238E27FC236}">
-                <a16:creationId xmlns:a16="http://schemas.microsoft.com/office/drawing/2014/main" xmlns="" id="{9BF7728E-C01A-4686-AD71-F7B61E8209D8}"/>
+                <a16:creationId xmlns="" xmlns:a16="http://schemas.microsoft.com/office/drawing/2014/main" id="{9BF7728E-C01A-4686-AD71-F7B61E8209D8}"/>
               </a:ext>
             </a:extLst>
           </p:cNvPr>
@@ -1225,7 +1225,7 @@
           <p:cNvPr id="6" name="Slide Number Placeholder 5">
             <a:extLst>
               <a:ext uri="{FF2B5EF4-FFF2-40B4-BE49-F238E27FC236}">
-                <a16:creationId xmlns:a16="http://schemas.microsoft.com/office/drawing/2014/main" xmlns="" id="{07C71C28-1E00-4F0A-8B9D-A0E460685EFB}"/>
+                <a16:creationId xmlns="" xmlns:a16="http://schemas.microsoft.com/office/drawing/2014/main" id="{07C71C28-1E00-4F0A-8B9D-A0E460685EFB}"/>
               </a:ext>
             </a:extLst>
           </p:cNvPr>
@@ -1366,7 +1366,7 @@
           <p:cNvPr id="4" name="Date Placeholder 3">
             <a:extLst>
               <a:ext uri="{FF2B5EF4-FFF2-40B4-BE49-F238E27FC236}">
-                <a16:creationId xmlns:a16="http://schemas.microsoft.com/office/drawing/2014/main" xmlns="" id="{7CDB27E7-0E5F-45FD-B9BC-82F6ACE50540}"/>
+                <a16:creationId xmlns="" xmlns:a16="http://schemas.microsoft.com/office/drawing/2014/main" id="{7CDB27E7-0E5F-45FD-B9BC-82F6ACE50540}"/>
               </a:ext>
             </a:extLst>
           </p:cNvPr>
@@ -1399,7 +1399,7 @@
           <p:cNvPr id="5" name="Footer Placeholder 4">
             <a:extLst>
               <a:ext uri="{FF2B5EF4-FFF2-40B4-BE49-F238E27FC236}">
-                <a16:creationId xmlns:a16="http://schemas.microsoft.com/office/drawing/2014/main" xmlns="" id="{B5E0F7A6-907E-418D-ABF6-CE0D106D2569}"/>
+                <a16:creationId xmlns="" xmlns:a16="http://schemas.microsoft.com/office/drawing/2014/main" id="{B5E0F7A6-907E-418D-ABF6-CE0D106D2569}"/>
               </a:ext>
             </a:extLst>
           </p:cNvPr>
@@ -1428,7 +1428,7 @@
           <p:cNvPr id="6" name="Slide Number Placeholder 5">
             <a:extLst>
               <a:ext uri="{FF2B5EF4-FFF2-40B4-BE49-F238E27FC236}">
-                <a16:creationId xmlns:a16="http://schemas.microsoft.com/office/drawing/2014/main" xmlns="" id="{0336D880-0EA6-4FCD-A723-C393235639F8}"/>
+                <a16:creationId xmlns="" xmlns:a16="http://schemas.microsoft.com/office/drawing/2014/main" id="{0336D880-0EA6-4FCD-A723-C393235639F8}"/>
               </a:ext>
             </a:extLst>
           </p:cNvPr>
@@ -1645,7 +1645,7 @@
           <p:cNvPr id="4" name="Date Placeholder 3">
             <a:extLst>
               <a:ext uri="{FF2B5EF4-FFF2-40B4-BE49-F238E27FC236}">
-                <a16:creationId xmlns:a16="http://schemas.microsoft.com/office/drawing/2014/main" xmlns="" id="{A7DDAA96-8682-4C88-9622-87E036243D1F}"/>
+                <a16:creationId xmlns="" xmlns:a16="http://schemas.microsoft.com/office/drawing/2014/main" id="{A7DDAA96-8682-4C88-9622-87E036243D1F}"/>
               </a:ext>
             </a:extLst>
           </p:cNvPr>
@@ -1678,7 +1678,7 @@
           <p:cNvPr id="5" name="Footer Placeholder 4">
             <a:extLst>
               <a:ext uri="{FF2B5EF4-FFF2-40B4-BE49-F238E27FC236}">
-                <a16:creationId xmlns:a16="http://schemas.microsoft.com/office/drawing/2014/main" xmlns="" id="{F4C29450-6172-4A34-B37F-64FAD195B70A}"/>
+                <a16:creationId xmlns="" xmlns:a16="http://schemas.microsoft.com/office/drawing/2014/main" id="{F4C29450-6172-4A34-B37F-64FAD195B70A}"/>
               </a:ext>
             </a:extLst>
           </p:cNvPr>
@@ -1707,7 +1707,7 @@
           <p:cNvPr id="6" name="Slide Number Placeholder 5">
             <a:extLst>
               <a:ext uri="{FF2B5EF4-FFF2-40B4-BE49-F238E27FC236}">
-                <a16:creationId xmlns:a16="http://schemas.microsoft.com/office/drawing/2014/main" xmlns="" id="{363A622E-84FA-417F-BD5A-BE81A4899820}"/>
+                <a16:creationId xmlns="" xmlns:a16="http://schemas.microsoft.com/office/drawing/2014/main" id="{363A622E-84FA-417F-BD5A-BE81A4899820}"/>
               </a:ext>
             </a:extLst>
           </p:cNvPr>
@@ -1910,7 +1910,7 @@
           <p:cNvPr id="5" name="Date Placeholder 3">
             <a:extLst>
               <a:ext uri="{FF2B5EF4-FFF2-40B4-BE49-F238E27FC236}">
-                <a16:creationId xmlns:a16="http://schemas.microsoft.com/office/drawing/2014/main" xmlns="" id="{C0375BCC-EEE9-412B-A532-7314FE84B0C4}"/>
+                <a16:creationId xmlns="" xmlns:a16="http://schemas.microsoft.com/office/drawing/2014/main" id="{C0375BCC-EEE9-412B-A532-7314FE84B0C4}"/>
               </a:ext>
             </a:extLst>
           </p:cNvPr>
@@ -1943,7 +1943,7 @@
           <p:cNvPr id="6" name="Footer Placeholder 4">
             <a:extLst>
               <a:ext uri="{FF2B5EF4-FFF2-40B4-BE49-F238E27FC236}">
-                <a16:creationId xmlns:a16="http://schemas.microsoft.com/office/drawing/2014/main" xmlns="" id="{1E5CB5DD-B599-4B4E-BFCE-CB9E35FBCEB1}"/>
+                <a16:creationId xmlns="" xmlns:a16="http://schemas.microsoft.com/office/drawing/2014/main" id="{1E5CB5DD-B599-4B4E-BFCE-CB9E35FBCEB1}"/>
               </a:ext>
             </a:extLst>
           </p:cNvPr>
@@ -1972,7 +1972,7 @@
           <p:cNvPr id="7" name="Slide Number Placeholder 5">
             <a:extLst>
               <a:ext uri="{FF2B5EF4-FFF2-40B4-BE49-F238E27FC236}">
-                <a16:creationId xmlns:a16="http://schemas.microsoft.com/office/drawing/2014/main" xmlns="" id="{C7CE3315-9445-4BB5-89D3-235E587ABF37}"/>
+                <a16:creationId xmlns="" xmlns:a16="http://schemas.microsoft.com/office/drawing/2014/main" id="{C7CE3315-9445-4BB5-89D3-235E587ABF37}"/>
               </a:ext>
             </a:extLst>
           </p:cNvPr>
@@ -2310,7 +2310,7 @@
           <p:cNvPr id="7" name="Date Placeholder 3">
             <a:extLst>
               <a:ext uri="{FF2B5EF4-FFF2-40B4-BE49-F238E27FC236}">
-                <a16:creationId xmlns:a16="http://schemas.microsoft.com/office/drawing/2014/main" xmlns="" id="{530AD5EF-C609-4119-B375-3771413B48DE}"/>
+                <a16:creationId xmlns="" xmlns:a16="http://schemas.microsoft.com/office/drawing/2014/main" id="{530AD5EF-C609-4119-B375-3771413B48DE}"/>
               </a:ext>
             </a:extLst>
           </p:cNvPr>
@@ -2343,7 +2343,7 @@
           <p:cNvPr id="8" name="Footer Placeholder 4">
             <a:extLst>
               <a:ext uri="{FF2B5EF4-FFF2-40B4-BE49-F238E27FC236}">
-                <a16:creationId xmlns:a16="http://schemas.microsoft.com/office/drawing/2014/main" xmlns="" id="{88A9EBF0-B7B0-4583-92AB-A3431DE6283E}"/>
+                <a16:creationId xmlns="" xmlns:a16="http://schemas.microsoft.com/office/drawing/2014/main" id="{88A9EBF0-B7B0-4583-92AB-A3431DE6283E}"/>
               </a:ext>
             </a:extLst>
           </p:cNvPr>
@@ -2372,7 +2372,7 @@
           <p:cNvPr id="9" name="Slide Number Placeholder 5">
             <a:extLst>
               <a:ext uri="{FF2B5EF4-FFF2-40B4-BE49-F238E27FC236}">
-                <a16:creationId xmlns:a16="http://schemas.microsoft.com/office/drawing/2014/main" xmlns="" id="{283BC57B-A7E4-4277-9D46-579496497245}"/>
+                <a16:creationId xmlns="" xmlns:a16="http://schemas.microsoft.com/office/drawing/2014/main" id="{283BC57B-A7E4-4277-9D46-579496497245}"/>
               </a:ext>
             </a:extLst>
           </p:cNvPr>
@@ -2461,7 +2461,7 @@
           <p:cNvPr id="3" name="Date Placeholder 3">
             <a:extLst>
               <a:ext uri="{FF2B5EF4-FFF2-40B4-BE49-F238E27FC236}">
-                <a16:creationId xmlns:a16="http://schemas.microsoft.com/office/drawing/2014/main" xmlns="" id="{41D81C82-41E3-4C7D-816C-58F99A1702F2}"/>
+                <a16:creationId xmlns="" xmlns:a16="http://schemas.microsoft.com/office/drawing/2014/main" id="{41D81C82-41E3-4C7D-816C-58F99A1702F2}"/>
               </a:ext>
             </a:extLst>
           </p:cNvPr>
@@ -2494,7 +2494,7 @@
           <p:cNvPr id="4" name="Footer Placeholder 4">
             <a:extLst>
               <a:ext uri="{FF2B5EF4-FFF2-40B4-BE49-F238E27FC236}">
-                <a16:creationId xmlns:a16="http://schemas.microsoft.com/office/drawing/2014/main" xmlns="" id="{21C23C57-193A-4FFE-AF84-5DDAD504531C}"/>
+                <a16:creationId xmlns="" xmlns:a16="http://schemas.microsoft.com/office/drawing/2014/main" id="{21C23C57-193A-4FFE-AF84-5DDAD504531C}"/>
               </a:ext>
             </a:extLst>
           </p:cNvPr>
@@ -2523,7 +2523,7 @@
           <p:cNvPr id="5" name="Slide Number Placeholder 5">
             <a:extLst>
               <a:ext uri="{FF2B5EF4-FFF2-40B4-BE49-F238E27FC236}">
-                <a16:creationId xmlns:a16="http://schemas.microsoft.com/office/drawing/2014/main" xmlns="" id="{E00AA421-04F3-46DC-9A65-181848BF7FC6}"/>
+                <a16:creationId xmlns="" xmlns:a16="http://schemas.microsoft.com/office/drawing/2014/main" id="{E00AA421-04F3-46DC-9A65-181848BF7FC6}"/>
               </a:ext>
             </a:extLst>
           </p:cNvPr>
@@ -2589,7 +2589,7 @@
           <p:cNvPr id="2" name="Date Placeholder 3">
             <a:extLst>
               <a:ext uri="{FF2B5EF4-FFF2-40B4-BE49-F238E27FC236}">
-                <a16:creationId xmlns:a16="http://schemas.microsoft.com/office/drawing/2014/main" xmlns="" id="{3218A1C0-5E86-44FA-96CE-D0C3A0911C5A}"/>
+                <a16:creationId xmlns="" xmlns:a16="http://schemas.microsoft.com/office/drawing/2014/main" id="{3218A1C0-5E86-44FA-96CE-D0C3A0911C5A}"/>
               </a:ext>
             </a:extLst>
           </p:cNvPr>
@@ -2622,7 +2622,7 @@
           <p:cNvPr id="3" name="Footer Placeholder 4">
             <a:extLst>
               <a:ext uri="{FF2B5EF4-FFF2-40B4-BE49-F238E27FC236}">
-                <a16:creationId xmlns:a16="http://schemas.microsoft.com/office/drawing/2014/main" xmlns="" id="{DC30598B-A85E-40F2-B0F9-CC04D8E3F3EA}"/>
+                <a16:creationId xmlns="" xmlns:a16="http://schemas.microsoft.com/office/drawing/2014/main" id="{DC30598B-A85E-40F2-B0F9-CC04D8E3F3EA}"/>
               </a:ext>
             </a:extLst>
           </p:cNvPr>
@@ -2651,7 +2651,7 @@
           <p:cNvPr id="4" name="Slide Number Placeholder 5">
             <a:extLst>
               <a:ext uri="{FF2B5EF4-FFF2-40B4-BE49-F238E27FC236}">
-                <a16:creationId xmlns:a16="http://schemas.microsoft.com/office/drawing/2014/main" xmlns="" id="{620ADC7C-B221-49C5-9757-EBEBB0F9207F}"/>
+                <a16:creationId xmlns="" xmlns:a16="http://schemas.microsoft.com/office/drawing/2014/main" id="{620ADC7C-B221-49C5-9757-EBEBB0F9207F}"/>
               </a:ext>
             </a:extLst>
           </p:cNvPr>
@@ -2899,7 +2899,7 @@
           <p:cNvPr id="5" name="Date Placeholder 3">
             <a:extLst>
               <a:ext uri="{FF2B5EF4-FFF2-40B4-BE49-F238E27FC236}">
-                <a16:creationId xmlns:a16="http://schemas.microsoft.com/office/drawing/2014/main" xmlns="" id="{D79DD4CF-015F-4F62-A63C-9D088FAC4792}"/>
+                <a16:creationId xmlns="" xmlns:a16="http://schemas.microsoft.com/office/drawing/2014/main" id="{D79DD4CF-015F-4F62-A63C-9D088FAC4792}"/>
               </a:ext>
             </a:extLst>
           </p:cNvPr>
@@ -2932,7 +2932,7 @@
           <p:cNvPr id="6" name="Footer Placeholder 4">
             <a:extLst>
               <a:ext uri="{FF2B5EF4-FFF2-40B4-BE49-F238E27FC236}">
-                <a16:creationId xmlns:a16="http://schemas.microsoft.com/office/drawing/2014/main" xmlns="" id="{9F56518C-25E4-4791-80CF-9603927DE7B7}"/>
+                <a16:creationId xmlns="" xmlns:a16="http://schemas.microsoft.com/office/drawing/2014/main" id="{9F56518C-25E4-4791-80CF-9603927DE7B7}"/>
               </a:ext>
             </a:extLst>
           </p:cNvPr>
@@ -2961,7 +2961,7 @@
           <p:cNvPr id="7" name="Slide Number Placeholder 5">
             <a:extLst>
               <a:ext uri="{FF2B5EF4-FFF2-40B4-BE49-F238E27FC236}">
-                <a16:creationId xmlns:a16="http://schemas.microsoft.com/office/drawing/2014/main" xmlns="" id="{646B593C-043B-40F1-98DA-B1906E58EBEB}"/>
+                <a16:creationId xmlns="" xmlns:a16="http://schemas.microsoft.com/office/drawing/2014/main" id="{646B593C-043B-40F1-98DA-B1906E58EBEB}"/>
               </a:ext>
             </a:extLst>
           </p:cNvPr>
@@ -3192,7 +3192,7 @@
           <p:cNvPr id="5" name="Date Placeholder 3">
             <a:extLst>
               <a:ext uri="{FF2B5EF4-FFF2-40B4-BE49-F238E27FC236}">
-                <a16:creationId xmlns:a16="http://schemas.microsoft.com/office/drawing/2014/main" xmlns="" id="{AB5A9D87-E05A-4D16-A703-1E97A8BA2C34}"/>
+                <a16:creationId xmlns="" xmlns:a16="http://schemas.microsoft.com/office/drawing/2014/main" id="{AB5A9D87-E05A-4D16-A703-1E97A8BA2C34}"/>
               </a:ext>
             </a:extLst>
           </p:cNvPr>
@@ -3225,7 +3225,7 @@
           <p:cNvPr id="6" name="Footer Placeholder 4">
             <a:extLst>
               <a:ext uri="{FF2B5EF4-FFF2-40B4-BE49-F238E27FC236}">
-                <a16:creationId xmlns:a16="http://schemas.microsoft.com/office/drawing/2014/main" xmlns="" id="{50E92F1C-94F6-478A-96CC-20CEB3BF8218}"/>
+                <a16:creationId xmlns="" xmlns:a16="http://schemas.microsoft.com/office/drawing/2014/main" id="{50E92F1C-94F6-478A-96CC-20CEB3BF8218}"/>
               </a:ext>
             </a:extLst>
           </p:cNvPr>
@@ -3254,7 +3254,7 @@
           <p:cNvPr id="7" name="Slide Number Placeholder 5">
             <a:extLst>
               <a:ext uri="{FF2B5EF4-FFF2-40B4-BE49-F238E27FC236}">
-                <a16:creationId xmlns:a16="http://schemas.microsoft.com/office/drawing/2014/main" xmlns="" id="{51659F05-47D4-46F4-A7AC-A02AE18D3546}"/>
+                <a16:creationId xmlns="" xmlns:a16="http://schemas.microsoft.com/office/drawing/2014/main" id="{51659F05-47D4-46F4-A7AC-A02AE18D3546}"/>
               </a:ext>
             </a:extLst>
           </p:cNvPr>
@@ -3328,7 +3328,7 @@
           <p:cNvPr id="1026" name="Title Placeholder 1">
             <a:extLst>
               <a:ext uri="{FF2B5EF4-FFF2-40B4-BE49-F238E27FC236}">
-                <a16:creationId xmlns:a16="http://schemas.microsoft.com/office/drawing/2014/main" xmlns="" id="{D9A3E1B4-65C6-415A-9681-D05B402B0E8D}"/>
+                <a16:creationId xmlns="" xmlns:a16="http://schemas.microsoft.com/office/drawing/2014/main" id="{D9A3E1B4-65C6-415A-9681-D05B402B0E8D}"/>
               </a:ext>
             </a:extLst>
           </p:cNvPr>
@@ -3392,7 +3392,7 @@
           <p:cNvPr id="1027" name="Text Placeholder 2">
             <a:extLst>
               <a:ext uri="{FF2B5EF4-FFF2-40B4-BE49-F238E27FC236}">
-                <a16:creationId xmlns:a16="http://schemas.microsoft.com/office/drawing/2014/main" xmlns="" id="{0C566853-DAEB-4CB7-818F-723C37230FEE}"/>
+                <a16:creationId xmlns="" xmlns:a16="http://schemas.microsoft.com/office/drawing/2014/main" id="{0C566853-DAEB-4CB7-818F-723C37230FEE}"/>
               </a:ext>
             </a:extLst>
           </p:cNvPr>
@@ -3484,7 +3484,7 @@
           <p:cNvPr id="4" name="Date Placeholder 3">
             <a:extLst>
               <a:ext uri="{FF2B5EF4-FFF2-40B4-BE49-F238E27FC236}">
-                <a16:creationId xmlns:a16="http://schemas.microsoft.com/office/drawing/2014/main" xmlns="" id="{A04BD739-9829-4F69-BC53-75013DDD1851}"/>
+                <a16:creationId xmlns="" xmlns:a16="http://schemas.microsoft.com/office/drawing/2014/main" id="{A04BD739-9829-4F69-BC53-75013DDD1851}"/>
               </a:ext>
             </a:extLst>
           </p:cNvPr>
@@ -3531,7 +3531,7 @@
           <p:cNvPr id="5" name="Footer Placeholder 4">
             <a:extLst>
               <a:ext uri="{FF2B5EF4-FFF2-40B4-BE49-F238E27FC236}">
-                <a16:creationId xmlns:a16="http://schemas.microsoft.com/office/drawing/2014/main" xmlns="" id="{505F0A4C-9308-45AA-A1AA-7B038DC01F28}"/>
+                <a16:creationId xmlns="" xmlns:a16="http://schemas.microsoft.com/office/drawing/2014/main" id="{505F0A4C-9308-45AA-A1AA-7B038DC01F28}"/>
               </a:ext>
             </a:extLst>
           </p:cNvPr>
@@ -3574,7 +3574,7 @@
           <p:cNvPr id="6" name="Slide Number Placeholder 5">
             <a:extLst>
               <a:ext uri="{FF2B5EF4-FFF2-40B4-BE49-F238E27FC236}">
-                <a16:creationId xmlns:a16="http://schemas.microsoft.com/office/drawing/2014/main" xmlns="" id="{142AE0DB-89DF-4A35-9269-9E85DEA2E368}"/>
+                <a16:creationId xmlns="" xmlns:a16="http://schemas.microsoft.com/office/drawing/2014/main" id="{142AE0DB-89DF-4A35-9269-9E85DEA2E368}"/>
               </a:ext>
             </a:extLst>
           </p:cNvPr>
@@ -3623,7 +3623,7 @@
           <p:cNvPr id="1031" name="Picture 7">
             <a:extLst>
               <a:ext uri="{FF2B5EF4-FFF2-40B4-BE49-F238E27FC236}">
-                <a16:creationId xmlns:a16="http://schemas.microsoft.com/office/drawing/2014/main" xmlns="" id="{102663E2-6C69-49E4-9FEB-A0ED3DD955FD}"/>
+                <a16:creationId xmlns="" xmlns:a16="http://schemas.microsoft.com/office/drawing/2014/main" id="{102663E2-6C69-49E4-9FEB-A0ED3DD955FD}"/>
               </a:ext>
             </a:extLst>
           </p:cNvPr>
@@ -4270,18 +4270,18 @@
               <a:buSzPts val="2000"/>
             </a:pPr>
             <a:r>
-              <a:rPr lang="en-GB" dirty="0">
+              <a:rPr lang="en-GB" dirty="0" smtClean="0">
                 <a:latin typeface="Cambria" panose="02040503050406030204" pitchFamily="18" charset="0"/>
                 <a:ea typeface="Cambria" panose="02040503050406030204" pitchFamily="18" charset="0"/>
               </a:rPr>
-              <a:t>Batch </a:t>
-            </a:r>
-            <a:r>
-              <a:rPr lang="en-GB" dirty="0" err="1" smtClean="0">
+              <a:t>Group</a:t>
+            </a:r>
+            <a:r>
+              <a:rPr lang="en-GB" dirty="0" smtClean="0">
                 <a:latin typeface="Cambria" panose="02040503050406030204" pitchFamily="18" charset="0"/>
                 <a:ea typeface="Cambria" panose="02040503050406030204" pitchFamily="18" charset="0"/>
               </a:rPr>
-              <a:t>Nuber</a:t>
+              <a:t> Number</a:t>
             </a:r>
             <a:r>
               <a:rPr lang="en-GB" dirty="0">
@@ -4360,14 +4360,14 @@
                 <a:gridCol w="1563750">
                   <a:extLst>
                     <a:ext uri="{9D8B030D-6E8A-4147-A177-3AD203B41FA5}">
-                      <a16:colId xmlns:a16="http://schemas.microsoft.com/office/drawing/2014/main" xmlns="" val="20000"/>
+                      <a16:colId xmlns="" xmlns:a16="http://schemas.microsoft.com/office/drawing/2014/main" val="20000"/>
                     </a:ext>
                   </a:extLst>
                 </a:gridCol>
                 <a:gridCol w="2500256">
                   <a:extLst>
                     <a:ext uri="{9D8B030D-6E8A-4147-A177-3AD203B41FA5}">
-                      <a16:colId xmlns:a16="http://schemas.microsoft.com/office/drawing/2014/main" xmlns="" val="20001"/>
+                      <a16:colId xmlns="" xmlns:a16="http://schemas.microsoft.com/office/drawing/2014/main" val="20001"/>
                     </a:ext>
                   </a:extLst>
                 </a:gridCol>
@@ -4511,7 +4511,7 @@
                 </a:tc>
                 <a:extLst>
                   <a:ext uri="{0D108BD9-81ED-4DB2-BD59-A6C34878D82A}">
-                    <a16:rowId xmlns:a16="http://schemas.microsoft.com/office/drawing/2014/main" xmlns="" val="10000"/>
+                    <a16:rowId xmlns="" xmlns:a16="http://schemas.microsoft.com/office/drawing/2014/main" val="10000"/>
                   </a:ext>
                 </a:extLst>
               </a:tr>
@@ -4647,7 +4647,7 @@
                 </a:tc>
                 <a:extLst>
                   <a:ext uri="{0D108BD9-81ED-4DB2-BD59-A6C34878D82A}">
-                    <a16:rowId xmlns:a16="http://schemas.microsoft.com/office/drawing/2014/main" xmlns="" val="10001"/>
+                    <a16:rowId xmlns="" xmlns:a16="http://schemas.microsoft.com/office/drawing/2014/main" val="10001"/>
                   </a:ext>
                 </a:extLst>
               </a:tr>
@@ -4782,7 +4782,7 @@
                 </a:tc>
                 <a:extLst>
                   <a:ext uri="{0D108BD9-81ED-4DB2-BD59-A6C34878D82A}">
-                    <a16:rowId xmlns:a16="http://schemas.microsoft.com/office/drawing/2014/main" xmlns="" val="10002"/>
+                    <a16:rowId xmlns="" xmlns:a16="http://schemas.microsoft.com/office/drawing/2014/main" val="10002"/>
                   </a:ext>
                 </a:extLst>
               </a:tr>
@@ -4917,7 +4917,7 @@
                 </a:tc>
                 <a:extLst>
                   <a:ext uri="{0D108BD9-81ED-4DB2-BD59-A6C34878D82A}">
-                    <a16:rowId xmlns:a16="http://schemas.microsoft.com/office/drawing/2014/main" xmlns="" val="10003"/>
+                    <a16:rowId xmlns="" xmlns:a16="http://schemas.microsoft.com/office/drawing/2014/main" val="10003"/>
                   </a:ext>
                 </a:extLst>
               </a:tr>
@@ -5052,7 +5052,7 @@
                 </a:tc>
                 <a:extLst>
                   <a:ext uri="{0D108BD9-81ED-4DB2-BD59-A6C34878D82A}">
-                    <a16:rowId xmlns:a16="http://schemas.microsoft.com/office/drawing/2014/main" xmlns="" val="10004"/>
+                    <a16:rowId xmlns="" xmlns:a16="http://schemas.microsoft.com/office/drawing/2014/main" val="10004"/>
                   </a:ext>
                 </a:extLst>
               </a:tr>
@@ -5187,7 +5187,7 @@
                 </a:tc>
                 <a:extLst>
                   <a:ext uri="{0D108BD9-81ED-4DB2-BD59-A6C34878D82A}">
-                    <a16:rowId xmlns:a16="http://schemas.microsoft.com/office/drawing/2014/main" xmlns="" val="10005"/>
+                    <a16:rowId xmlns="" xmlns:a16="http://schemas.microsoft.com/office/drawing/2014/main" val="10005"/>
                   </a:ext>
                 </a:extLst>
               </a:tr>
@@ -5804,7 +5804,7 @@
           <p:cNvPr id="4" name="Table 3">
             <a:extLst>
               <a:ext uri="{FF2B5EF4-FFF2-40B4-BE49-F238E27FC236}">
-                <a16:creationId xmlns:a16="http://schemas.microsoft.com/office/drawing/2014/main" xmlns="" id="{04132B3C-8145-710E-B7F7-7BD3DFBF612D}"/>
+                <a16:creationId xmlns="" xmlns:a16="http://schemas.microsoft.com/office/drawing/2014/main" id="{04132B3C-8145-710E-B7F7-7BD3DFBF612D}"/>
               </a:ext>
             </a:extLst>
           </p:cNvPr>
@@ -5833,14 +5833,14 @@
                 <a:gridCol w="2165444">
                   <a:extLst>
                     <a:ext uri="{9D8B030D-6E8A-4147-A177-3AD203B41FA5}">
-                      <a16:colId xmlns:a16="http://schemas.microsoft.com/office/drawing/2014/main" xmlns="" val="3409789910"/>
+                      <a16:colId xmlns="" xmlns:a16="http://schemas.microsoft.com/office/drawing/2014/main" val="3409789910"/>
                     </a:ext>
                   </a:extLst>
                 </a:gridCol>
                 <a:gridCol w="2165444">
                   <a:extLst>
                     <a:ext uri="{9D8B030D-6E8A-4147-A177-3AD203B41FA5}">
-                      <a16:colId xmlns:a16="http://schemas.microsoft.com/office/drawing/2014/main" xmlns="" val="3804636631"/>
+                      <a16:colId xmlns="" xmlns:a16="http://schemas.microsoft.com/office/drawing/2014/main" val="3804636631"/>
                     </a:ext>
                   </a:extLst>
                 </a:gridCol>
@@ -5880,7 +5880,7 @@
                 </a:tc>
                 <a:extLst>
                   <a:ext uri="{0D108BD9-81ED-4DB2-BD59-A6C34878D82A}">
-                    <a16:rowId xmlns:a16="http://schemas.microsoft.com/office/drawing/2014/main" xmlns="" val="532316839"/>
+                    <a16:rowId xmlns="" xmlns:a16="http://schemas.microsoft.com/office/drawing/2014/main" val="532316839"/>
                   </a:ext>
                 </a:extLst>
               </a:tr>
@@ -5919,7 +5919,7 @@
                 </a:tc>
                 <a:extLst>
                   <a:ext uri="{0D108BD9-81ED-4DB2-BD59-A6C34878D82A}">
-                    <a16:rowId xmlns:a16="http://schemas.microsoft.com/office/drawing/2014/main" xmlns="" val="552776016"/>
+                    <a16:rowId xmlns="" xmlns:a16="http://schemas.microsoft.com/office/drawing/2014/main" val="552776016"/>
                   </a:ext>
                 </a:extLst>
               </a:tr>
@@ -5958,7 +5958,7 @@
                 </a:tc>
                 <a:extLst>
                   <a:ext uri="{0D108BD9-81ED-4DB2-BD59-A6C34878D82A}">
-                    <a16:rowId xmlns:a16="http://schemas.microsoft.com/office/drawing/2014/main" xmlns="" val="2648078616"/>
+                    <a16:rowId xmlns="" xmlns:a16="http://schemas.microsoft.com/office/drawing/2014/main" val="2648078616"/>
                   </a:ext>
                 </a:extLst>
               </a:tr>
@@ -5997,7 +5997,7 @@
                 </a:tc>
                 <a:extLst>
                   <a:ext uri="{0D108BD9-81ED-4DB2-BD59-A6C34878D82A}">
-                    <a16:rowId xmlns:a16="http://schemas.microsoft.com/office/drawing/2014/main" xmlns="" val="137161872"/>
+                    <a16:rowId xmlns="" xmlns:a16="http://schemas.microsoft.com/office/drawing/2014/main" val="137161872"/>
                   </a:ext>
                 </a:extLst>
               </a:tr>
@@ -6008,7 +6008,7 @@
                     <a:lstStyle/>
                     <a:p>
                       <a:r>
-                        <a:rPr lang="en-US" sz="1000">
+                        <a:rPr lang="en-US" sz="1000" dirty="0">
                           <a:latin typeface="Calibri" panose="020F0502020204030204" pitchFamily="34" charset="0"/>
                           <a:cs typeface="Calibri" panose="020F0502020204030204" pitchFamily="34" charset="0"/>
                         </a:rPr>
@@ -6036,7 +6036,7 @@
                 </a:tc>
                 <a:extLst>
                   <a:ext uri="{0D108BD9-81ED-4DB2-BD59-A6C34878D82A}">
-                    <a16:rowId xmlns:a16="http://schemas.microsoft.com/office/drawing/2014/main" xmlns="" val="1378620462"/>
+                    <a16:rowId xmlns="" xmlns:a16="http://schemas.microsoft.com/office/drawing/2014/main" val="1378620462"/>
                   </a:ext>
                 </a:extLst>
               </a:tr>
@@ -6077,7 +6077,7 @@
           <p:cNvPr id="5" name="Content Placeholder 4">
             <a:extLst>
               <a:ext uri="{FF2B5EF4-FFF2-40B4-BE49-F238E27FC236}">
-                <a16:creationId xmlns:a16="http://schemas.microsoft.com/office/drawing/2014/main" xmlns="" id="{925FFD44-AB3B-B511-D55A-56F24860D22B}"/>
+                <a16:creationId xmlns="" xmlns:a16="http://schemas.microsoft.com/office/drawing/2014/main" id="{925FFD44-AB3B-B511-D55A-56F24860D22B}"/>
               </a:ext>
             </a:extLst>
           </p:cNvPr>
@@ -6139,7 +6139,7 @@
           <p:cNvPr id="5" name="Content Placeholder 4">
             <a:extLst>
               <a:ext uri="{FF2B5EF4-FFF2-40B4-BE49-F238E27FC236}">
-                <a16:creationId xmlns:a16="http://schemas.microsoft.com/office/drawing/2014/main" xmlns="" id="{7FE7162C-941A-4786-B6AC-174C2F3E285F}"/>
+                <a16:creationId xmlns="" xmlns:a16="http://schemas.microsoft.com/office/drawing/2014/main" id="{7FE7162C-941A-4786-B6AC-174C2F3E285F}"/>
               </a:ext>
             </a:extLst>
           </p:cNvPr>
@@ -6201,7 +6201,7 @@
           <p:cNvPr id="3" name="Content Placeholder 2">
             <a:extLst>
               <a:ext uri="{FF2B5EF4-FFF2-40B4-BE49-F238E27FC236}">
-                <a16:creationId xmlns:a16="http://schemas.microsoft.com/office/drawing/2014/main" xmlns="" id="{6E0DE5DA-FC41-B1F9-F9FC-12E8CA94FBAD}"/>
+                <a16:creationId xmlns="" xmlns:a16="http://schemas.microsoft.com/office/drawing/2014/main" id="{6E0DE5DA-FC41-B1F9-F9FC-12E8CA94FBAD}"/>
               </a:ext>
             </a:extLst>
           </p:cNvPr>
@@ -6285,9 +6285,6 @@
               </a:rPr>
               <a:t>https://github.com/snehaballari/Talking-Fingers.git</a:t>
             </a:r>
-            <a:endParaRPr lang="en-IN" sz="3200" b="1" dirty="0">
-              <a:latin typeface="+mj-lt"/>
-            </a:endParaRPr>
           </a:p>
         </p:txBody>
       </p:sp>
@@ -6409,7 +6406,7 @@
           <p:cNvPr id="1026" name="Picture 2" descr="Thank You Images – Browse 375,541 Stock ...">
             <a:extLst>
               <a:ext uri="{FF2B5EF4-FFF2-40B4-BE49-F238E27FC236}">
-                <a16:creationId xmlns:a16="http://schemas.microsoft.com/office/drawing/2014/main" xmlns="" id="{53ED79D0-4A90-798D-6721-A3F226D912AA}"/>
+                <a16:creationId xmlns="" xmlns:a16="http://schemas.microsoft.com/office/drawing/2014/main" id="{53ED79D0-4A90-798D-6721-A3F226D912AA}"/>
               </a:ext>
             </a:extLst>
           </p:cNvPr>
@@ -7405,7 +7402,7 @@
   <a:extraClrSchemeLst/>
   <a:extLst>
     <a:ext uri="{05A4C25C-085E-4340-85A3-A5531E510DB2}">
-      <thm15:themeFamily xmlns:thm15="http://schemas.microsoft.com/office/thememl/2012/main" xmlns="" name="Theme1" id="{23E5E7DE-FA75-47E7-8D22-6B90529762D9}" vid="{750F0BDB-F7D8-4C6A-BE4F-217CED694AC3}"/>
+      <thm15:themeFamily xmlns="" xmlns:thm15="http://schemas.microsoft.com/office/thememl/2012/main" name="Theme1" id="{23E5E7DE-FA75-47E7-8D22-6B90529762D9}" vid="{750F0BDB-F7D8-4C6A-BE4F-217CED694AC3}"/>
     </a:ext>
   </a:extLst>
 </a:theme>
@@ -7700,7 +7697,7 @@
   <a:extraClrSchemeLst/>
   <a:extLst>
     <a:ext uri="{05A4C25C-085E-4340-85A3-A5531E510DB2}">
-      <thm15:themeFamily xmlns:thm15="http://schemas.microsoft.com/office/thememl/2012/main" xmlns="" name="Office Theme" id="{62F939B6-93AF-4DB8-9C6B-D6C7DFDC589F}" vid="{4A3C46E8-61CC-4603-A589-7422A47A8E4A}"/>
+      <thm15:themeFamily xmlns="" xmlns:thm15="http://schemas.microsoft.com/office/thememl/2012/main" name="Office Theme" id="{62F939B6-93AF-4DB8-9C6B-D6C7DFDC589F}" vid="{4A3C46E8-61CC-4603-A589-7422A47A8E4A}"/>
     </a:ext>
   </a:extLst>
 </a:theme>

</xml_diff>